<commit_message>
added small amount of vailidation broken
</commit_message>
<xml_diff>
--- a/Presentation/Jarjat-ConstellationLogger-Presentation.pptx
+++ b/Presentation/Jarjat-ConstellationLogger-Presentation.pptx
@@ -31909,7 +31909,7 @@
         </p:blipFill>
         <p:spPr>
           <a:xfrm>
-            <a:off x="3732212" y="2664619"/>
+            <a:off x="3784600" y="1928093"/>
             <a:ext cx="7529861" cy="2108278"/>
           </a:xfrm>
           <a:prstGeom prst="rect">
@@ -31917,6 +31917,41 @@
           </a:prstGeom>
         </p:spPr>
       </p:pic>
+      <p:sp>
+        <p:nvSpPr>
+          <p:cNvPr id="21" name="TextBox 20">
+            <a:extLst>
+              <a:ext uri="{FF2B5EF4-FFF2-40B4-BE49-F238E27FC236}">
+                <a16:creationId xmlns:a16="http://schemas.microsoft.com/office/drawing/2014/main" id="{79EDB3C6-E110-16E1-1EAD-7D89B055AD69}"/>
+              </a:ext>
+            </a:extLst>
+          </p:cNvPr>
+          <p:cNvSpPr txBox="1"/>
+          <p:nvPr/>
+        </p:nvSpPr>
+        <p:spPr>
+          <a:xfrm>
+            <a:off x="3852800" y="5096947"/>
+            <a:ext cx="7529861" cy="369332"/>
+          </a:xfrm>
+          <a:prstGeom prst="rect">
+            <a:avLst/>
+          </a:prstGeom>
+          <a:noFill/>
+        </p:spPr>
+        <p:txBody>
+          <a:bodyPr wrap="square" rtlCol="0">
+            <a:spAutoFit/>
+          </a:bodyPr>
+          <a:lstStyle/>
+          <a:p>
+            <a:r>
+              <a:rPr lang="en-GB" dirty="0"/>
+              <a:t>https://github.com/jarjc001/ConstellationLogger</a:t>
+            </a:r>
+          </a:p>
+        </p:txBody>
+      </p:sp>
     </p:spTree>
     <p:extLst>
       <p:ext uri="{BB962C8B-B14F-4D97-AF65-F5344CB8AC3E}">

</xml_diff>